<commit_message>
Update Continuous Delivery Part 2 presentation
</commit_message>
<xml_diff>
--- a/Bootcamp-ContinuousDelivery_2.pptx
+++ b/Bootcamp-ContinuousDelivery_2.pptx
@@ -971,15 +971,7 @@
           <a:p>
             <a:r>
               <a:rPr lang="en-US" dirty="0" smtClean="0"/>
-              <a:t>As you promote your application through test, </a:t>
-            </a:r>
-            <a:r>
-              <a:rPr lang="en-US" dirty="0" smtClean="0"/>
-              <a:t>staging </a:t>
-            </a:r>
-            <a:r>
-              <a:rPr lang="en-US" dirty="0" smtClean="0"/>
-              <a:t>and production, there are going to be differences in database connection strings, application settings, web service URLs, and many other parameters.</a:t>
+              <a:t>As you promote your application through test, staging and production, there are going to be differences in database connection strings, application settings, web service URLs, and many other parameters.</a:t>
             </a:r>
           </a:p>
           <a:p>
@@ -4985,7 +4977,7 @@
           <p:cNvPr id="2" name="Title 1">
             <a:extLst>
               <a:ext uri="{FF2B5EF4-FFF2-40B4-BE49-F238E27FC236}">
-                <a16:creationId xmlns="" xmlns:a16="http://schemas.microsoft.com/office/drawing/2014/main" id="{E43653FA-C236-438B-8E8D-48A7F4314C49}"/>
+                <a16:creationId xmlns:a16="http://schemas.microsoft.com/office/drawing/2014/main" xmlns="" id="{E43653FA-C236-438B-8E8D-48A7F4314C49}"/>
               </a:ext>
             </a:extLst>
           </p:cNvPr>
@@ -5013,7 +5005,7 @@
           <p:cNvPr id="4" name="Subtitle 3">
             <a:extLst>
               <a:ext uri="{FF2B5EF4-FFF2-40B4-BE49-F238E27FC236}">
-                <a16:creationId xmlns="" xmlns:a16="http://schemas.microsoft.com/office/drawing/2014/main" id="{C4E31A7C-DBD3-458C-BEC2-8B7296DE3BEB}"/>
+                <a16:creationId xmlns:a16="http://schemas.microsoft.com/office/drawing/2014/main" xmlns="" id="{C4E31A7C-DBD3-458C-BEC2-8B7296DE3BEB}"/>
               </a:ext>
             </a:extLst>
           </p:cNvPr>
@@ -5096,10 +5088,42 @@
           <a:lstStyle/>
           <a:p>
             <a:r>
-              <a:rPr lang="it-IT" sz="2800" dirty="0"/>
-              <a:t>CI vs CD vs CD</a:t>
-            </a:r>
-            <a:endParaRPr lang="en-GB" sz="2800" dirty="0"/>
+              <a:rPr lang="it-IT" sz="1800" dirty="0" err="1"/>
+              <a:t>Continuous</a:t>
+            </a:r>
+            <a:r>
+              <a:rPr lang="it-IT" sz="1800" dirty="0"/>
+              <a:t> </a:t>
+            </a:r>
+            <a:r>
+              <a:rPr lang="it-IT" sz="1800" dirty="0" err="1"/>
+              <a:t>integration</a:t>
+            </a:r>
+            <a:r>
+              <a:rPr lang="it-IT" sz="1800" dirty="0"/>
+              <a:t> vs. </a:t>
+            </a:r>
+            <a:r>
+              <a:rPr lang="it-IT" sz="1800" dirty="0" err="1"/>
+              <a:t>continuous</a:t>
+            </a:r>
+            <a:r>
+              <a:rPr lang="it-IT" sz="1800" dirty="0"/>
+              <a:t> delivery vs. </a:t>
+            </a:r>
+            <a:r>
+              <a:rPr lang="it-IT" sz="1800" dirty="0" err="1"/>
+              <a:t>continuous</a:t>
+            </a:r>
+            <a:r>
+              <a:rPr lang="it-IT" sz="1800" dirty="0"/>
+              <a:t> </a:t>
+            </a:r>
+            <a:r>
+              <a:rPr lang="it-IT" sz="1800" dirty="0" err="1"/>
+              <a:t>deployment</a:t>
+            </a:r>
+            <a:endParaRPr lang="en-GB" sz="1800" dirty="0"/>
           </a:p>
         </p:txBody>
       </p:sp>
@@ -5540,7 +5564,7 @@
           <p:nvPr>
             <p:extLst>
               <p:ext uri="{386F3935-93C4-4BCD-93E2-E3B085C9AB24}">
-                <p16:designElem xmlns="" xmlns:p16="http://schemas.microsoft.com/office/powerpoint/2015/main" val="1"/>
+                <p16:designElem xmlns:p16="http://schemas.microsoft.com/office/powerpoint/2015/main" xmlns="" val="1"/>
               </p:ext>
             </p:extLst>
           </p:nvPr>
@@ -5593,7 +5617,7 @@
           <p:nvPr>
             <p:extLst>
               <p:ext uri="{386F3935-93C4-4BCD-93E2-E3B085C9AB24}">
-                <p16:designElem xmlns="" xmlns:p16="http://schemas.microsoft.com/office/powerpoint/2015/main" val="1"/>
+                <p16:designElem xmlns:p16="http://schemas.microsoft.com/office/powerpoint/2015/main" xmlns="" val="1"/>
               </p:ext>
             </p:extLst>
           </p:nvPr>
@@ -5639,7 +5663,7 @@
           <p:nvPr>
             <p:extLst>
               <p:ext uri="{386F3935-93C4-4BCD-93E2-E3B085C9AB24}">
-                <p16:designElem xmlns="" xmlns:p16="http://schemas.microsoft.com/office/powerpoint/2015/main" val="1"/>
+                <p16:designElem xmlns:p16="http://schemas.microsoft.com/office/powerpoint/2015/main" xmlns="" val="1"/>
               </p:ext>
             </p:extLst>
           </p:nvPr>
@@ -5685,7 +5709,7 @@
           <p:nvPr>
             <p:extLst>
               <p:ext uri="{386F3935-93C4-4BCD-93E2-E3B085C9AB24}">
-                <p16:designElem xmlns="" xmlns:p16="http://schemas.microsoft.com/office/powerpoint/2015/main" val="1"/>
+                <p16:designElem xmlns:p16="http://schemas.microsoft.com/office/powerpoint/2015/main" xmlns="" val="1"/>
               </p:ext>
             </p:extLst>
           </p:nvPr>
@@ -5737,7 +5761,7 @@
           <p:cNvPr id="3" name="Title 2">
             <a:extLst>
               <a:ext uri="{FF2B5EF4-FFF2-40B4-BE49-F238E27FC236}">
-                <a16:creationId xmlns="" xmlns:a16="http://schemas.microsoft.com/office/drawing/2014/main" id="{4A5665C2-CF24-4FDD-8E12-177E5A331057}"/>
+                <a16:creationId xmlns:a16="http://schemas.microsoft.com/office/drawing/2014/main" xmlns="" id="{4A5665C2-CF24-4FDD-8E12-177E5A331057}"/>
               </a:ext>
             </a:extLst>
           </p:cNvPr>
@@ -5791,7 +5815,7 @@
           <p:cNvPr id="5" name="Subtitle 4">
             <a:extLst>
               <a:ext uri="{FF2B5EF4-FFF2-40B4-BE49-F238E27FC236}">
-                <a16:creationId xmlns="" xmlns:a16="http://schemas.microsoft.com/office/drawing/2014/main" id="{F2B8D1D6-6B10-4E3F-8851-D9CEDDB13C4C}"/>
+                <a16:creationId xmlns:a16="http://schemas.microsoft.com/office/drawing/2014/main" xmlns="" id="{F2B8D1D6-6B10-4E3F-8851-D9CEDDB13C4C}"/>
               </a:ext>
             </a:extLst>
           </p:cNvPr>
@@ -6092,7 +6116,7 @@
   <a:extraClrSchemeLst/>
   <a:extLst>
     <a:ext uri="{05A4C25C-085E-4340-85A3-A5531E510DB2}">
-      <thm15:themeFamily xmlns="" xmlns:thm15="http://schemas.microsoft.com/office/thememl/2012/main" name="Frame" id="{F226E7A2-7162-461C-9490-D27D9DC04E43}" vid="{629A0216-3BBD-45C0-B63F-2683BEA18F60}"/>
+      <thm15:themeFamily xmlns:thm15="http://schemas.microsoft.com/office/thememl/2012/main" xmlns="" name="Frame" id="{F226E7A2-7162-461C-9490-D27D9DC04E43}" vid="{629A0216-3BBD-45C0-B63F-2683BEA18F60}"/>
     </a:ext>
   </a:extLst>
 </a:theme>

</xml_diff>